<commit_message>
Space between console write lines
</commit_message>
<xml_diff>
--- a/DesignPatternCSharp.pptx
+++ b/DesignPatternCSharp.pptx
@@ -113,6 +113,11 @@
       </a:defRPr>
     </a:lvl9pPr>
   </p:defaultTextStyle>
+  <p:extLst>
+    <p:ext uri="{EFAFB233-063F-42B5-8137-9DF3F51BA10A}">
+      <p15:sldGuideLst xmlns:p15="http://schemas.microsoft.com/office/powerpoint/2012/main"/>
+    </p:ext>
+  </p:extLst>
 </p:presentation>
 </file>
 
@@ -265,7 +270,7 @@
           <a:p>
             <a:fld id="{1253F186-91DA-4955-8176-AE3F673CCAFF}" type="datetimeFigureOut">
               <a:rPr lang="hu-HU" smtClean="0"/>
-              <a:t>2021. 04. 08.</a:t>
+              <a:t>2021. 04. 09.</a:t>
             </a:fld>
             <a:endParaRPr lang="hu-HU"/>
           </a:p>
@@ -465,7 +470,7 @@
           <a:p>
             <a:fld id="{1253F186-91DA-4955-8176-AE3F673CCAFF}" type="datetimeFigureOut">
               <a:rPr lang="hu-HU" smtClean="0"/>
-              <a:t>2021. 04. 08.</a:t>
+              <a:t>2021. 04. 09.</a:t>
             </a:fld>
             <a:endParaRPr lang="hu-HU"/>
           </a:p>
@@ -675,7 +680,7 @@
           <a:p>
             <a:fld id="{1253F186-91DA-4955-8176-AE3F673CCAFF}" type="datetimeFigureOut">
               <a:rPr lang="hu-HU" smtClean="0"/>
-              <a:t>2021. 04. 08.</a:t>
+              <a:t>2021. 04. 09.</a:t>
             </a:fld>
             <a:endParaRPr lang="hu-HU"/>
           </a:p>
@@ -875,7 +880,7 @@
           <a:p>
             <a:fld id="{1253F186-91DA-4955-8176-AE3F673CCAFF}" type="datetimeFigureOut">
               <a:rPr lang="hu-HU" smtClean="0"/>
-              <a:t>2021. 04. 08.</a:t>
+              <a:t>2021. 04. 09.</a:t>
             </a:fld>
             <a:endParaRPr lang="hu-HU"/>
           </a:p>
@@ -1151,7 +1156,7 @@
           <a:p>
             <a:fld id="{1253F186-91DA-4955-8176-AE3F673CCAFF}" type="datetimeFigureOut">
               <a:rPr lang="hu-HU" smtClean="0"/>
-              <a:t>2021. 04. 08.</a:t>
+              <a:t>2021. 04. 09.</a:t>
             </a:fld>
             <a:endParaRPr lang="hu-HU"/>
           </a:p>
@@ -1419,7 +1424,7 @@
           <a:p>
             <a:fld id="{1253F186-91DA-4955-8176-AE3F673CCAFF}" type="datetimeFigureOut">
               <a:rPr lang="hu-HU" smtClean="0"/>
-              <a:t>2021. 04. 08.</a:t>
+              <a:t>2021. 04. 09.</a:t>
             </a:fld>
             <a:endParaRPr lang="hu-HU"/>
           </a:p>
@@ -1834,7 +1839,7 @@
           <a:p>
             <a:fld id="{1253F186-91DA-4955-8176-AE3F673CCAFF}" type="datetimeFigureOut">
               <a:rPr lang="hu-HU" smtClean="0"/>
-              <a:t>2021. 04. 08.</a:t>
+              <a:t>2021. 04. 09.</a:t>
             </a:fld>
             <a:endParaRPr lang="hu-HU"/>
           </a:p>
@@ -1976,7 +1981,7 @@
           <a:p>
             <a:fld id="{1253F186-91DA-4955-8176-AE3F673CCAFF}" type="datetimeFigureOut">
               <a:rPr lang="hu-HU" smtClean="0"/>
-              <a:t>2021. 04. 08.</a:t>
+              <a:t>2021. 04. 09.</a:t>
             </a:fld>
             <a:endParaRPr lang="hu-HU"/>
           </a:p>
@@ -2089,7 +2094,7 @@
           <a:p>
             <a:fld id="{1253F186-91DA-4955-8176-AE3F673CCAFF}" type="datetimeFigureOut">
               <a:rPr lang="hu-HU" smtClean="0"/>
-              <a:t>2021. 04. 08.</a:t>
+              <a:t>2021. 04. 09.</a:t>
             </a:fld>
             <a:endParaRPr lang="hu-HU"/>
           </a:p>
@@ -2402,7 +2407,7 @@
           <a:p>
             <a:fld id="{1253F186-91DA-4955-8176-AE3F673CCAFF}" type="datetimeFigureOut">
               <a:rPr lang="hu-HU" smtClean="0"/>
-              <a:t>2021. 04. 08.</a:t>
+              <a:t>2021. 04. 09.</a:t>
             </a:fld>
             <a:endParaRPr lang="hu-HU"/>
           </a:p>
@@ -2691,7 +2696,7 @@
           <a:p>
             <a:fld id="{1253F186-91DA-4955-8176-AE3F673CCAFF}" type="datetimeFigureOut">
               <a:rPr lang="hu-HU" smtClean="0"/>
-              <a:t>2021. 04. 08.</a:t>
+              <a:t>2021. 04. 09.</a:t>
             </a:fld>
             <a:endParaRPr lang="hu-HU"/>
           </a:p>
@@ -2934,7 +2939,7 @@
           <a:p>
             <a:fld id="{1253F186-91DA-4955-8176-AE3F673CCAFF}" type="datetimeFigureOut">
               <a:rPr lang="hu-HU" smtClean="0"/>
-              <a:t>2021. 04. 08.</a:t>
+              <a:t>2021. 04. 09.</a:t>
             </a:fld>
             <a:endParaRPr lang="hu-HU"/>
           </a:p>
@@ -3380,31 +3385,6 @@
           </a:p>
         </p:txBody>
       </p:sp>
-      <p:sp>
-        <p:nvSpPr>
-          <p:cNvPr id="3" name="Subtitle 2">
-            <a:extLst>
-              <a:ext uri="{FF2B5EF4-FFF2-40B4-BE49-F238E27FC236}">
-                <a16:creationId xmlns:a16="http://schemas.microsoft.com/office/drawing/2014/main" id="{5FA89F01-908B-4125-AA91-70CE66D98D5C}"/>
-              </a:ext>
-            </a:extLst>
-          </p:cNvPr>
-          <p:cNvSpPr>
-            <a:spLocks noGrp="1"/>
-          </p:cNvSpPr>
-          <p:nvPr>
-            <p:ph type="subTitle" idx="1"/>
-          </p:nvPr>
-        </p:nvSpPr>
-        <p:spPr/>
-        <p:txBody>
-          <a:bodyPr/>
-          <a:lstStyle/>
-          <a:p>
-            <a:endParaRPr lang="hu-HU"/>
-          </a:p>
-        </p:txBody>
-      </p:sp>
     </p:spTree>
     <p:extLst>
       <p:ext uri="{BB962C8B-B14F-4D97-AF65-F5344CB8AC3E}">

</xml_diff>